<commit_message>
Deploying to gh-pages from @ LiuX2018/LiuX2018.github.io@751b4b805a1eaf888b152954445951dcbbd29455 🚀
</commit_message>
<xml_diff>
--- a/assets/img/animations.pptx
+++ b/assets/img/animations.pptx
@@ -2,12 +2,12 @@
 <file path=ppt/presentation.xml><?xml version="1.0" encoding="utf-8"?>
 <p:presentation xmlns:a="http://schemas.openxmlformats.org/drawingml/2006/main" xmlns:r="http://schemas.openxmlformats.org/officeDocument/2006/relationships" xmlns:p="http://schemas.openxmlformats.org/presentationml/2006/main" saveSubsetFonts="1">
   <p:sldMasterIdLst>
-    <p:sldMasterId id="2147483660" r:id="rId1"/>
+    <p:sldMasterId id="2147483684" r:id="rId1"/>
   </p:sldMasterIdLst>
   <p:sldIdLst>
     <p:sldId id="256" r:id="rId2"/>
   </p:sldIdLst>
-  <p:sldSz cx="6480175" cy="6480175"/>
+  <p:sldSz cx="1079500" cy="1079500"/>
   <p:notesSz cx="6858000" cy="9144000"/>
   <p:defaultTextStyle>
     <a:defPPr>
@@ -107,12 +107,12 @@
   <p:extLst>
     <p:ext uri="{EFAFB233-063F-42B5-8137-9DF3F51BA10A}">
       <p15:sldGuideLst xmlns:p15="http://schemas.microsoft.com/office/powerpoint/2012/main">
-        <p15:guide id="1" orient="horz" pos="2041" userDrawn="1">
+        <p15:guide id="1" orient="horz" pos="340" userDrawn="1">
           <p15:clr>
             <a:srgbClr val="A4A3A4"/>
           </p15:clr>
         </p15:guide>
-        <p15:guide id="2" pos="2041" userDrawn="1">
+        <p15:guide id="2" pos="340" userDrawn="1">
           <p15:clr>
             <a:srgbClr val="A4A3A4"/>
           </p15:clr>
@@ -152,15 +152,15 @@
         </p:nvSpPr>
         <p:spPr>
           <a:xfrm>
-            <a:off x="486013" y="1060529"/>
-            <a:ext cx="5508149" cy="2256061"/>
+            <a:off x="80963" y="176668"/>
+            <a:ext cx="917575" cy="375826"/>
           </a:xfrm>
         </p:spPr>
         <p:txBody>
           <a:bodyPr anchor="b"/>
           <a:lstStyle>
             <a:lvl1pPr algn="ctr">
-              <a:defRPr sz="4252"/>
+              <a:defRPr sz="709"/>
             </a:lvl1pPr>
           </a:lstStyle>
           <a:p>
@@ -184,8 +184,8 @@
         </p:nvSpPr>
         <p:spPr>
           <a:xfrm>
-            <a:off x="810022" y="3403592"/>
-            <a:ext cx="4860131" cy="1564542"/>
+            <a:off x="134938" y="566988"/>
+            <a:ext cx="809625" cy="260629"/>
           </a:xfrm>
         </p:spPr>
         <p:txBody>
@@ -193,39 +193,39 @@
           <a:lstStyle>
             <a:lvl1pPr marL="0" indent="0" algn="ctr">
               <a:buNone/>
-              <a:defRPr sz="1701"/>
+              <a:defRPr sz="283"/>
             </a:lvl1pPr>
-            <a:lvl2pPr marL="324018" indent="0" algn="ctr">
-              <a:buNone/>
-              <a:defRPr sz="1417"/>
+            <a:lvl2pPr marL="53995" indent="0" algn="ctr">
+              <a:buNone/>
+              <a:defRPr sz="236"/>
             </a:lvl2pPr>
-            <a:lvl3pPr marL="648035" indent="0" algn="ctr">
-              <a:buNone/>
-              <a:defRPr sz="1276"/>
+            <a:lvl3pPr marL="107991" indent="0" algn="ctr">
+              <a:buNone/>
+              <a:defRPr sz="213"/>
             </a:lvl3pPr>
-            <a:lvl4pPr marL="972053" indent="0" algn="ctr">
-              <a:buNone/>
-              <a:defRPr sz="1134"/>
+            <a:lvl4pPr marL="161986" indent="0" algn="ctr">
+              <a:buNone/>
+              <a:defRPr sz="189"/>
             </a:lvl4pPr>
-            <a:lvl5pPr marL="1296071" indent="0" algn="ctr">
-              <a:buNone/>
-              <a:defRPr sz="1134"/>
+            <a:lvl5pPr marL="215981" indent="0" algn="ctr">
+              <a:buNone/>
+              <a:defRPr sz="189"/>
             </a:lvl5pPr>
-            <a:lvl6pPr marL="1620088" indent="0" algn="ctr">
-              <a:buNone/>
-              <a:defRPr sz="1134"/>
+            <a:lvl6pPr marL="269977" indent="0" algn="ctr">
+              <a:buNone/>
+              <a:defRPr sz="189"/>
             </a:lvl6pPr>
-            <a:lvl7pPr marL="1944106" indent="0" algn="ctr">
-              <a:buNone/>
-              <a:defRPr sz="1134"/>
+            <a:lvl7pPr marL="323972" indent="0" algn="ctr">
+              <a:buNone/>
+              <a:defRPr sz="189"/>
             </a:lvl7pPr>
-            <a:lvl8pPr marL="2268123" indent="0" algn="ctr">
-              <a:buNone/>
-              <a:defRPr sz="1134"/>
+            <a:lvl8pPr marL="377967" indent="0" algn="ctr">
+              <a:buNone/>
+              <a:defRPr sz="189"/>
             </a:lvl8pPr>
-            <a:lvl9pPr marL="2592141" indent="0" algn="ctr">
-              <a:buNone/>
-              <a:defRPr sz="1134"/>
+            <a:lvl9pPr marL="431963" indent="0" algn="ctr">
+              <a:buNone/>
+              <a:defRPr sz="189"/>
             </a:lvl9pPr>
           </a:lstStyle>
           <a:p>
@@ -305,7 +305,7 @@
     </p:spTree>
     <p:extLst>
       <p:ext uri="{BB962C8B-B14F-4D97-AF65-F5344CB8AC3E}">
-        <p14:creationId xmlns:p14="http://schemas.microsoft.com/office/powerpoint/2010/main" val="2043657788"/>
+        <p14:creationId xmlns:p14="http://schemas.microsoft.com/office/powerpoint/2010/main" val="3397563305"/>
       </p:ext>
     </p:extLst>
   </p:cSld>
@@ -475,7 +475,7 @@
     </p:spTree>
     <p:extLst>
       <p:ext uri="{BB962C8B-B14F-4D97-AF65-F5344CB8AC3E}">
-        <p14:creationId xmlns:p14="http://schemas.microsoft.com/office/powerpoint/2010/main" val="1381466189"/>
+        <p14:creationId xmlns:p14="http://schemas.microsoft.com/office/powerpoint/2010/main" val="4019090852"/>
       </p:ext>
     </p:extLst>
   </p:cSld>
@@ -514,8 +514,8 @@
         </p:nvSpPr>
         <p:spPr>
           <a:xfrm>
-            <a:off x="4637375" y="345009"/>
-            <a:ext cx="1397288" cy="5491649"/>
+            <a:off x="772517" y="57474"/>
+            <a:ext cx="232767" cy="914826"/>
           </a:xfrm>
         </p:spPr>
         <p:txBody>
@@ -542,8 +542,8 @@
         </p:nvSpPr>
         <p:spPr>
           <a:xfrm>
-            <a:off x="445512" y="345009"/>
-            <a:ext cx="4110861" cy="5491649"/>
+            <a:off x="74216" y="57474"/>
+            <a:ext cx="684808" cy="914826"/>
           </a:xfrm>
         </p:spPr>
         <p:txBody>
@@ -655,7 +655,7 @@
     </p:spTree>
     <p:extLst>
       <p:ext uri="{BB962C8B-B14F-4D97-AF65-F5344CB8AC3E}">
-        <p14:creationId xmlns:p14="http://schemas.microsoft.com/office/powerpoint/2010/main" val="2888734525"/>
+        <p14:creationId xmlns:p14="http://schemas.microsoft.com/office/powerpoint/2010/main" val="3107923299"/>
       </p:ext>
     </p:extLst>
   </p:cSld>
@@ -825,7 +825,7 @@
     </p:spTree>
     <p:extLst>
       <p:ext uri="{BB962C8B-B14F-4D97-AF65-F5344CB8AC3E}">
-        <p14:creationId xmlns:p14="http://schemas.microsoft.com/office/powerpoint/2010/main" val="48320699"/>
+        <p14:creationId xmlns:p14="http://schemas.microsoft.com/office/powerpoint/2010/main" val="1468673809"/>
       </p:ext>
     </p:extLst>
   </p:cSld>
@@ -864,15 +864,15 @@
         </p:nvSpPr>
         <p:spPr>
           <a:xfrm>
-            <a:off x="442137" y="1615546"/>
-            <a:ext cx="5589151" cy="2695572"/>
+            <a:off x="73653" y="269126"/>
+            <a:ext cx="931069" cy="449042"/>
           </a:xfrm>
         </p:spPr>
         <p:txBody>
           <a:bodyPr anchor="b"/>
           <a:lstStyle>
             <a:lvl1pPr>
-              <a:defRPr sz="4252"/>
+              <a:defRPr sz="709"/>
             </a:lvl1pPr>
           </a:lstStyle>
           <a:p>
@@ -896,8 +896,8 @@
         </p:nvSpPr>
         <p:spPr>
           <a:xfrm>
-            <a:off x="442137" y="4336619"/>
-            <a:ext cx="5589151" cy="1417538"/>
+            <a:off x="73653" y="722415"/>
+            <a:ext cx="931069" cy="236141"/>
           </a:xfrm>
         </p:spPr>
         <p:txBody>
@@ -905,7 +905,7 @@
           <a:lstStyle>
             <a:lvl1pPr marL="0" indent="0">
               <a:buNone/>
-              <a:defRPr sz="1701">
+              <a:defRPr sz="283">
                 <a:solidFill>
                   <a:schemeClr val="tx1">
                     <a:tint val="82000"/>
@@ -913,9 +913,9 @@
                 </a:solidFill>
               </a:defRPr>
             </a:lvl1pPr>
-            <a:lvl2pPr marL="324018" indent="0">
-              <a:buNone/>
-              <a:defRPr sz="1417">
+            <a:lvl2pPr marL="53995" indent="0">
+              <a:buNone/>
+              <a:defRPr sz="236">
                 <a:solidFill>
                   <a:schemeClr val="tx1">
                     <a:tint val="82000"/>
@@ -923,9 +923,9 @@
                 </a:solidFill>
               </a:defRPr>
             </a:lvl2pPr>
-            <a:lvl3pPr marL="648035" indent="0">
-              <a:buNone/>
-              <a:defRPr sz="1276">
+            <a:lvl3pPr marL="107991" indent="0">
+              <a:buNone/>
+              <a:defRPr sz="213">
                 <a:solidFill>
                   <a:schemeClr val="tx1">
                     <a:tint val="82000"/>
@@ -933,9 +933,9 @@
                 </a:solidFill>
               </a:defRPr>
             </a:lvl3pPr>
-            <a:lvl4pPr marL="972053" indent="0">
-              <a:buNone/>
-              <a:defRPr sz="1134">
+            <a:lvl4pPr marL="161986" indent="0">
+              <a:buNone/>
+              <a:defRPr sz="189">
                 <a:solidFill>
                   <a:schemeClr val="tx1">
                     <a:tint val="82000"/>
@@ -943,9 +943,9 @@
                 </a:solidFill>
               </a:defRPr>
             </a:lvl4pPr>
-            <a:lvl5pPr marL="1296071" indent="0">
-              <a:buNone/>
-              <a:defRPr sz="1134">
+            <a:lvl5pPr marL="215981" indent="0">
+              <a:buNone/>
+              <a:defRPr sz="189">
                 <a:solidFill>
                   <a:schemeClr val="tx1">
                     <a:tint val="82000"/>
@@ -953,9 +953,9 @@
                 </a:solidFill>
               </a:defRPr>
             </a:lvl5pPr>
-            <a:lvl6pPr marL="1620088" indent="0">
-              <a:buNone/>
-              <a:defRPr sz="1134">
+            <a:lvl6pPr marL="269977" indent="0">
+              <a:buNone/>
+              <a:defRPr sz="189">
                 <a:solidFill>
                   <a:schemeClr val="tx1">
                     <a:tint val="82000"/>
@@ -963,9 +963,9 @@
                 </a:solidFill>
               </a:defRPr>
             </a:lvl6pPr>
-            <a:lvl7pPr marL="1944106" indent="0">
-              <a:buNone/>
-              <a:defRPr sz="1134">
+            <a:lvl7pPr marL="323972" indent="0">
+              <a:buNone/>
+              <a:defRPr sz="189">
                 <a:solidFill>
                   <a:schemeClr val="tx1">
                     <a:tint val="82000"/>
@@ -973,9 +973,9 @@
                 </a:solidFill>
               </a:defRPr>
             </a:lvl7pPr>
-            <a:lvl8pPr marL="2268123" indent="0">
-              <a:buNone/>
-              <a:defRPr sz="1134">
+            <a:lvl8pPr marL="377967" indent="0">
+              <a:buNone/>
+              <a:defRPr sz="189">
                 <a:solidFill>
                   <a:schemeClr val="tx1">
                     <a:tint val="82000"/>
@@ -983,9 +983,9 @@
                 </a:solidFill>
               </a:defRPr>
             </a:lvl8pPr>
-            <a:lvl9pPr marL="2592141" indent="0">
-              <a:buNone/>
-              <a:defRPr sz="1134">
+            <a:lvl9pPr marL="431963" indent="0">
+              <a:buNone/>
+              <a:defRPr sz="189">
                 <a:solidFill>
                   <a:schemeClr val="tx1">
                     <a:tint val="82000"/>
@@ -1071,7 +1071,7 @@
     </p:spTree>
     <p:extLst>
       <p:ext uri="{BB962C8B-B14F-4D97-AF65-F5344CB8AC3E}">
-        <p14:creationId xmlns:p14="http://schemas.microsoft.com/office/powerpoint/2010/main" val="4096290082"/>
+        <p14:creationId xmlns:p14="http://schemas.microsoft.com/office/powerpoint/2010/main" val="758635104"/>
       </p:ext>
     </p:extLst>
   </p:cSld>
@@ -1133,8 +1133,8 @@
         </p:nvSpPr>
         <p:spPr>
           <a:xfrm>
-            <a:off x="445512" y="1725046"/>
-            <a:ext cx="2754074" cy="4111612"/>
+            <a:off x="74215" y="287367"/>
+            <a:ext cx="458788" cy="684933"/>
           </a:xfrm>
         </p:spPr>
         <p:txBody>
@@ -1190,8 +1190,8 @@
         </p:nvSpPr>
         <p:spPr>
           <a:xfrm>
-            <a:off x="3280589" y="1725046"/>
-            <a:ext cx="2754074" cy="4111612"/>
+            <a:off x="546497" y="287367"/>
+            <a:ext cx="458788" cy="684933"/>
           </a:xfrm>
         </p:spPr>
         <p:txBody>
@@ -1303,7 +1303,7 @@
     </p:spTree>
     <p:extLst>
       <p:ext uri="{BB962C8B-B14F-4D97-AF65-F5344CB8AC3E}">
-        <p14:creationId xmlns:p14="http://schemas.microsoft.com/office/powerpoint/2010/main" val="965845329"/>
+        <p14:creationId xmlns:p14="http://schemas.microsoft.com/office/powerpoint/2010/main" val="933613638"/>
       </p:ext>
     </p:extLst>
   </p:cSld>
@@ -1342,8 +1342,8 @@
         </p:nvSpPr>
         <p:spPr>
           <a:xfrm>
-            <a:off x="446356" y="345011"/>
-            <a:ext cx="5589151" cy="1252534"/>
+            <a:off x="74356" y="57474"/>
+            <a:ext cx="931069" cy="208653"/>
           </a:xfrm>
         </p:spPr>
         <p:txBody>
@@ -1370,8 +1370,8 @@
         </p:nvSpPr>
         <p:spPr>
           <a:xfrm>
-            <a:off x="446357" y="1588543"/>
-            <a:ext cx="2741417" cy="778521"/>
+            <a:off x="74356" y="264627"/>
+            <a:ext cx="456679" cy="129690"/>
           </a:xfrm>
         </p:spPr>
         <p:txBody>
@@ -1379,39 +1379,39 @@
           <a:lstStyle>
             <a:lvl1pPr marL="0" indent="0">
               <a:buNone/>
-              <a:defRPr sz="1701" b="1"/>
+              <a:defRPr sz="283" b="1"/>
             </a:lvl1pPr>
-            <a:lvl2pPr marL="324018" indent="0">
-              <a:buNone/>
-              <a:defRPr sz="1417" b="1"/>
+            <a:lvl2pPr marL="53995" indent="0">
+              <a:buNone/>
+              <a:defRPr sz="236" b="1"/>
             </a:lvl2pPr>
-            <a:lvl3pPr marL="648035" indent="0">
-              <a:buNone/>
-              <a:defRPr sz="1276" b="1"/>
+            <a:lvl3pPr marL="107991" indent="0">
+              <a:buNone/>
+              <a:defRPr sz="213" b="1"/>
             </a:lvl3pPr>
-            <a:lvl4pPr marL="972053" indent="0">
-              <a:buNone/>
-              <a:defRPr sz="1134" b="1"/>
+            <a:lvl4pPr marL="161986" indent="0">
+              <a:buNone/>
+              <a:defRPr sz="189" b="1"/>
             </a:lvl4pPr>
-            <a:lvl5pPr marL="1296071" indent="0">
-              <a:buNone/>
-              <a:defRPr sz="1134" b="1"/>
+            <a:lvl5pPr marL="215981" indent="0">
+              <a:buNone/>
+              <a:defRPr sz="189" b="1"/>
             </a:lvl5pPr>
-            <a:lvl6pPr marL="1620088" indent="0">
-              <a:buNone/>
-              <a:defRPr sz="1134" b="1"/>
+            <a:lvl6pPr marL="269977" indent="0">
+              <a:buNone/>
+              <a:defRPr sz="189" b="1"/>
             </a:lvl6pPr>
-            <a:lvl7pPr marL="1944106" indent="0">
-              <a:buNone/>
-              <a:defRPr sz="1134" b="1"/>
+            <a:lvl7pPr marL="323972" indent="0">
+              <a:buNone/>
+              <a:defRPr sz="189" b="1"/>
             </a:lvl7pPr>
-            <a:lvl8pPr marL="2268123" indent="0">
-              <a:buNone/>
-              <a:defRPr sz="1134" b="1"/>
+            <a:lvl8pPr marL="377967" indent="0">
+              <a:buNone/>
+              <a:defRPr sz="189" b="1"/>
             </a:lvl8pPr>
-            <a:lvl9pPr marL="2592141" indent="0">
-              <a:buNone/>
-              <a:defRPr sz="1134" b="1"/>
+            <a:lvl9pPr marL="431963" indent="0">
+              <a:buNone/>
+              <a:defRPr sz="189" b="1"/>
             </a:lvl9pPr>
           </a:lstStyle>
           <a:p>
@@ -1435,8 +1435,8 @@
         </p:nvSpPr>
         <p:spPr>
           <a:xfrm>
-            <a:off x="446357" y="2367064"/>
-            <a:ext cx="2741417" cy="3481594"/>
+            <a:off x="74356" y="394318"/>
+            <a:ext cx="456679" cy="579981"/>
           </a:xfrm>
         </p:spPr>
         <p:txBody>
@@ -1492,8 +1492,8 @@
         </p:nvSpPr>
         <p:spPr>
           <a:xfrm>
-            <a:off x="3280589" y="1588543"/>
-            <a:ext cx="2754918" cy="778521"/>
+            <a:off x="546497" y="264627"/>
+            <a:ext cx="458928" cy="129690"/>
           </a:xfrm>
         </p:spPr>
         <p:txBody>
@@ -1501,39 +1501,39 @@
           <a:lstStyle>
             <a:lvl1pPr marL="0" indent="0">
               <a:buNone/>
-              <a:defRPr sz="1701" b="1"/>
+              <a:defRPr sz="283" b="1"/>
             </a:lvl1pPr>
-            <a:lvl2pPr marL="324018" indent="0">
-              <a:buNone/>
-              <a:defRPr sz="1417" b="1"/>
+            <a:lvl2pPr marL="53995" indent="0">
+              <a:buNone/>
+              <a:defRPr sz="236" b="1"/>
             </a:lvl2pPr>
-            <a:lvl3pPr marL="648035" indent="0">
-              <a:buNone/>
-              <a:defRPr sz="1276" b="1"/>
+            <a:lvl3pPr marL="107991" indent="0">
+              <a:buNone/>
+              <a:defRPr sz="213" b="1"/>
             </a:lvl3pPr>
-            <a:lvl4pPr marL="972053" indent="0">
-              <a:buNone/>
-              <a:defRPr sz="1134" b="1"/>
+            <a:lvl4pPr marL="161986" indent="0">
+              <a:buNone/>
+              <a:defRPr sz="189" b="1"/>
             </a:lvl4pPr>
-            <a:lvl5pPr marL="1296071" indent="0">
-              <a:buNone/>
-              <a:defRPr sz="1134" b="1"/>
+            <a:lvl5pPr marL="215981" indent="0">
+              <a:buNone/>
+              <a:defRPr sz="189" b="1"/>
             </a:lvl5pPr>
-            <a:lvl6pPr marL="1620088" indent="0">
-              <a:buNone/>
-              <a:defRPr sz="1134" b="1"/>
+            <a:lvl6pPr marL="269977" indent="0">
+              <a:buNone/>
+              <a:defRPr sz="189" b="1"/>
             </a:lvl6pPr>
-            <a:lvl7pPr marL="1944106" indent="0">
-              <a:buNone/>
-              <a:defRPr sz="1134" b="1"/>
+            <a:lvl7pPr marL="323972" indent="0">
+              <a:buNone/>
+              <a:defRPr sz="189" b="1"/>
             </a:lvl7pPr>
-            <a:lvl8pPr marL="2268123" indent="0">
-              <a:buNone/>
-              <a:defRPr sz="1134" b="1"/>
+            <a:lvl8pPr marL="377967" indent="0">
+              <a:buNone/>
+              <a:defRPr sz="189" b="1"/>
             </a:lvl8pPr>
-            <a:lvl9pPr marL="2592141" indent="0">
-              <a:buNone/>
-              <a:defRPr sz="1134" b="1"/>
+            <a:lvl9pPr marL="431963" indent="0">
+              <a:buNone/>
+              <a:defRPr sz="189" b="1"/>
             </a:lvl9pPr>
           </a:lstStyle>
           <a:p>
@@ -1557,8 +1557,8 @@
         </p:nvSpPr>
         <p:spPr>
           <a:xfrm>
-            <a:off x="3280589" y="2367064"/>
-            <a:ext cx="2754918" cy="3481594"/>
+            <a:off x="546497" y="394318"/>
+            <a:ext cx="458928" cy="579981"/>
           </a:xfrm>
         </p:spPr>
         <p:txBody>
@@ -1670,7 +1670,7 @@
     </p:spTree>
     <p:extLst>
       <p:ext uri="{BB962C8B-B14F-4D97-AF65-F5344CB8AC3E}">
-        <p14:creationId xmlns:p14="http://schemas.microsoft.com/office/powerpoint/2010/main" val="1814483244"/>
+        <p14:creationId xmlns:p14="http://schemas.microsoft.com/office/powerpoint/2010/main" val="1387261379"/>
       </p:ext>
     </p:extLst>
   </p:cSld>
@@ -1788,7 +1788,7 @@
     </p:spTree>
     <p:extLst>
       <p:ext uri="{BB962C8B-B14F-4D97-AF65-F5344CB8AC3E}">
-        <p14:creationId xmlns:p14="http://schemas.microsoft.com/office/powerpoint/2010/main" val="1211050185"/>
+        <p14:creationId xmlns:p14="http://schemas.microsoft.com/office/powerpoint/2010/main" val="2554738455"/>
       </p:ext>
     </p:extLst>
   </p:cSld>
@@ -1883,7 +1883,7 @@
     </p:spTree>
     <p:extLst>
       <p:ext uri="{BB962C8B-B14F-4D97-AF65-F5344CB8AC3E}">
-        <p14:creationId xmlns:p14="http://schemas.microsoft.com/office/powerpoint/2010/main" val="591090467"/>
+        <p14:creationId xmlns:p14="http://schemas.microsoft.com/office/powerpoint/2010/main" val="1234122655"/>
       </p:ext>
     </p:extLst>
   </p:cSld>
@@ -1922,15 +1922,15 @@
         </p:nvSpPr>
         <p:spPr>
           <a:xfrm>
-            <a:off x="446356" y="432012"/>
-            <a:ext cx="2090025" cy="1512041"/>
+            <a:off x="74356" y="71967"/>
+            <a:ext cx="348167" cy="251883"/>
           </a:xfrm>
         </p:spPr>
         <p:txBody>
           <a:bodyPr anchor="b"/>
           <a:lstStyle>
             <a:lvl1pPr>
-              <a:defRPr sz="2268"/>
+              <a:defRPr sz="378"/>
             </a:lvl1pPr>
           </a:lstStyle>
           <a:p>
@@ -1954,39 +1954,39 @@
         </p:nvSpPr>
         <p:spPr>
           <a:xfrm>
-            <a:off x="2754918" y="933027"/>
-            <a:ext cx="3280589" cy="4605124"/>
+            <a:off x="458928" y="155428"/>
+            <a:ext cx="546497" cy="767145"/>
           </a:xfrm>
         </p:spPr>
         <p:txBody>
           <a:bodyPr/>
           <a:lstStyle>
             <a:lvl1pPr>
-              <a:defRPr sz="2268"/>
+              <a:defRPr sz="378"/>
             </a:lvl1pPr>
             <a:lvl2pPr>
-              <a:defRPr sz="1984"/>
+              <a:defRPr sz="331"/>
             </a:lvl2pPr>
             <a:lvl3pPr>
-              <a:defRPr sz="1701"/>
+              <a:defRPr sz="283"/>
             </a:lvl3pPr>
             <a:lvl4pPr>
-              <a:defRPr sz="1417"/>
+              <a:defRPr sz="236"/>
             </a:lvl4pPr>
             <a:lvl5pPr>
-              <a:defRPr sz="1417"/>
+              <a:defRPr sz="236"/>
             </a:lvl5pPr>
             <a:lvl6pPr>
-              <a:defRPr sz="1417"/>
+              <a:defRPr sz="236"/>
             </a:lvl6pPr>
             <a:lvl7pPr>
-              <a:defRPr sz="1417"/>
+              <a:defRPr sz="236"/>
             </a:lvl7pPr>
             <a:lvl8pPr>
-              <a:defRPr sz="1417"/>
+              <a:defRPr sz="236"/>
             </a:lvl8pPr>
             <a:lvl9pPr>
-              <a:defRPr sz="1417"/>
+              <a:defRPr sz="236"/>
             </a:lvl9pPr>
           </a:lstStyle>
           <a:p>
@@ -2039,8 +2039,8 @@
         </p:nvSpPr>
         <p:spPr>
           <a:xfrm>
-            <a:off x="446356" y="1944052"/>
-            <a:ext cx="2090025" cy="3601598"/>
+            <a:off x="74356" y="323850"/>
+            <a:ext cx="348167" cy="599972"/>
           </a:xfrm>
         </p:spPr>
         <p:txBody>
@@ -2048,39 +2048,39 @@
           <a:lstStyle>
             <a:lvl1pPr marL="0" indent="0">
               <a:buNone/>
-              <a:defRPr sz="1134"/>
+              <a:defRPr sz="189"/>
             </a:lvl1pPr>
-            <a:lvl2pPr marL="324018" indent="0">
-              <a:buNone/>
-              <a:defRPr sz="992"/>
+            <a:lvl2pPr marL="53995" indent="0">
+              <a:buNone/>
+              <a:defRPr sz="165"/>
             </a:lvl2pPr>
-            <a:lvl3pPr marL="648035" indent="0">
-              <a:buNone/>
-              <a:defRPr sz="850"/>
+            <a:lvl3pPr marL="107991" indent="0">
+              <a:buNone/>
+              <a:defRPr sz="142"/>
             </a:lvl3pPr>
-            <a:lvl4pPr marL="972053" indent="0">
-              <a:buNone/>
-              <a:defRPr sz="709"/>
+            <a:lvl4pPr marL="161986" indent="0">
+              <a:buNone/>
+              <a:defRPr sz="118"/>
             </a:lvl4pPr>
-            <a:lvl5pPr marL="1296071" indent="0">
-              <a:buNone/>
-              <a:defRPr sz="709"/>
+            <a:lvl5pPr marL="215981" indent="0">
+              <a:buNone/>
+              <a:defRPr sz="118"/>
             </a:lvl5pPr>
-            <a:lvl6pPr marL="1620088" indent="0">
-              <a:buNone/>
-              <a:defRPr sz="709"/>
+            <a:lvl6pPr marL="269977" indent="0">
+              <a:buNone/>
+              <a:defRPr sz="118"/>
             </a:lvl6pPr>
-            <a:lvl7pPr marL="1944106" indent="0">
-              <a:buNone/>
-              <a:defRPr sz="709"/>
+            <a:lvl7pPr marL="323972" indent="0">
+              <a:buNone/>
+              <a:defRPr sz="118"/>
             </a:lvl7pPr>
-            <a:lvl8pPr marL="2268123" indent="0">
-              <a:buNone/>
-              <a:defRPr sz="709"/>
+            <a:lvl8pPr marL="377967" indent="0">
+              <a:buNone/>
+              <a:defRPr sz="118"/>
             </a:lvl8pPr>
-            <a:lvl9pPr marL="2592141" indent="0">
-              <a:buNone/>
-              <a:defRPr sz="709"/>
+            <a:lvl9pPr marL="431963" indent="0">
+              <a:buNone/>
+              <a:defRPr sz="118"/>
             </a:lvl9pPr>
           </a:lstStyle>
           <a:p>
@@ -2160,7 +2160,7 @@
     </p:spTree>
     <p:extLst>
       <p:ext uri="{BB962C8B-B14F-4D97-AF65-F5344CB8AC3E}">
-        <p14:creationId xmlns:p14="http://schemas.microsoft.com/office/powerpoint/2010/main" val="163690561"/>
+        <p14:creationId xmlns:p14="http://schemas.microsoft.com/office/powerpoint/2010/main" val="1319101338"/>
       </p:ext>
     </p:extLst>
   </p:cSld>
@@ -2199,15 +2199,15 @@
         </p:nvSpPr>
         <p:spPr>
           <a:xfrm>
-            <a:off x="446356" y="432012"/>
-            <a:ext cx="2090025" cy="1512041"/>
+            <a:off x="74356" y="71967"/>
+            <a:ext cx="348167" cy="251883"/>
           </a:xfrm>
         </p:spPr>
         <p:txBody>
           <a:bodyPr anchor="b"/>
           <a:lstStyle>
             <a:lvl1pPr>
-              <a:defRPr sz="2268"/>
+              <a:defRPr sz="378"/>
             </a:lvl1pPr>
           </a:lstStyle>
           <a:p>
@@ -2231,8 +2231,8 @@
         </p:nvSpPr>
         <p:spPr>
           <a:xfrm>
-            <a:off x="2754918" y="933027"/>
-            <a:ext cx="3280589" cy="4605124"/>
+            <a:off x="458928" y="155428"/>
+            <a:ext cx="546497" cy="767145"/>
           </a:xfrm>
         </p:spPr>
         <p:txBody>
@@ -2240,39 +2240,39 @@
           <a:lstStyle>
             <a:lvl1pPr marL="0" indent="0">
               <a:buNone/>
-              <a:defRPr sz="2268"/>
+              <a:defRPr sz="378"/>
             </a:lvl1pPr>
-            <a:lvl2pPr marL="324018" indent="0">
-              <a:buNone/>
-              <a:defRPr sz="1984"/>
+            <a:lvl2pPr marL="53995" indent="0">
+              <a:buNone/>
+              <a:defRPr sz="331"/>
             </a:lvl2pPr>
-            <a:lvl3pPr marL="648035" indent="0">
-              <a:buNone/>
-              <a:defRPr sz="1701"/>
+            <a:lvl3pPr marL="107991" indent="0">
+              <a:buNone/>
+              <a:defRPr sz="283"/>
             </a:lvl3pPr>
-            <a:lvl4pPr marL="972053" indent="0">
-              <a:buNone/>
-              <a:defRPr sz="1417"/>
+            <a:lvl4pPr marL="161986" indent="0">
+              <a:buNone/>
+              <a:defRPr sz="236"/>
             </a:lvl4pPr>
-            <a:lvl5pPr marL="1296071" indent="0">
-              <a:buNone/>
-              <a:defRPr sz="1417"/>
+            <a:lvl5pPr marL="215981" indent="0">
+              <a:buNone/>
+              <a:defRPr sz="236"/>
             </a:lvl5pPr>
-            <a:lvl6pPr marL="1620088" indent="0">
-              <a:buNone/>
-              <a:defRPr sz="1417"/>
+            <a:lvl6pPr marL="269977" indent="0">
+              <a:buNone/>
+              <a:defRPr sz="236"/>
             </a:lvl6pPr>
-            <a:lvl7pPr marL="1944106" indent="0">
-              <a:buNone/>
-              <a:defRPr sz="1417"/>
+            <a:lvl7pPr marL="323972" indent="0">
+              <a:buNone/>
+              <a:defRPr sz="236"/>
             </a:lvl7pPr>
-            <a:lvl8pPr marL="2268123" indent="0">
-              <a:buNone/>
-              <a:defRPr sz="1417"/>
+            <a:lvl8pPr marL="377967" indent="0">
+              <a:buNone/>
+              <a:defRPr sz="236"/>
             </a:lvl8pPr>
-            <a:lvl9pPr marL="2592141" indent="0">
-              <a:buNone/>
-              <a:defRPr sz="1417"/>
+            <a:lvl9pPr marL="431963" indent="0">
+              <a:buNone/>
+              <a:defRPr sz="236"/>
             </a:lvl9pPr>
           </a:lstStyle>
           <a:p>
@@ -2296,8 +2296,8 @@
         </p:nvSpPr>
         <p:spPr>
           <a:xfrm>
-            <a:off x="446356" y="1944052"/>
-            <a:ext cx="2090025" cy="3601598"/>
+            <a:off x="74356" y="323850"/>
+            <a:ext cx="348167" cy="599972"/>
           </a:xfrm>
         </p:spPr>
         <p:txBody>
@@ -2305,39 +2305,39 @@
           <a:lstStyle>
             <a:lvl1pPr marL="0" indent="0">
               <a:buNone/>
-              <a:defRPr sz="1134"/>
+              <a:defRPr sz="189"/>
             </a:lvl1pPr>
-            <a:lvl2pPr marL="324018" indent="0">
-              <a:buNone/>
-              <a:defRPr sz="992"/>
+            <a:lvl2pPr marL="53995" indent="0">
+              <a:buNone/>
+              <a:defRPr sz="165"/>
             </a:lvl2pPr>
-            <a:lvl3pPr marL="648035" indent="0">
-              <a:buNone/>
-              <a:defRPr sz="850"/>
+            <a:lvl3pPr marL="107991" indent="0">
+              <a:buNone/>
+              <a:defRPr sz="142"/>
             </a:lvl3pPr>
-            <a:lvl4pPr marL="972053" indent="0">
-              <a:buNone/>
-              <a:defRPr sz="709"/>
+            <a:lvl4pPr marL="161986" indent="0">
+              <a:buNone/>
+              <a:defRPr sz="118"/>
             </a:lvl4pPr>
-            <a:lvl5pPr marL="1296071" indent="0">
-              <a:buNone/>
-              <a:defRPr sz="709"/>
+            <a:lvl5pPr marL="215981" indent="0">
+              <a:buNone/>
+              <a:defRPr sz="118"/>
             </a:lvl5pPr>
-            <a:lvl6pPr marL="1620088" indent="0">
-              <a:buNone/>
-              <a:defRPr sz="709"/>
+            <a:lvl6pPr marL="269977" indent="0">
+              <a:buNone/>
+              <a:defRPr sz="118"/>
             </a:lvl6pPr>
-            <a:lvl7pPr marL="1944106" indent="0">
-              <a:buNone/>
-              <a:defRPr sz="709"/>
+            <a:lvl7pPr marL="323972" indent="0">
+              <a:buNone/>
+              <a:defRPr sz="118"/>
             </a:lvl7pPr>
-            <a:lvl8pPr marL="2268123" indent="0">
-              <a:buNone/>
-              <a:defRPr sz="709"/>
+            <a:lvl8pPr marL="377967" indent="0">
+              <a:buNone/>
+              <a:defRPr sz="118"/>
             </a:lvl8pPr>
-            <a:lvl9pPr marL="2592141" indent="0">
-              <a:buNone/>
-              <a:defRPr sz="709"/>
+            <a:lvl9pPr marL="431963" indent="0">
+              <a:buNone/>
+              <a:defRPr sz="118"/>
             </a:lvl9pPr>
           </a:lstStyle>
           <a:p>
@@ -2417,7 +2417,7 @@
     </p:spTree>
     <p:extLst>
       <p:ext uri="{BB962C8B-B14F-4D97-AF65-F5344CB8AC3E}">
-        <p14:creationId xmlns:p14="http://schemas.microsoft.com/office/powerpoint/2010/main" val="4159691295"/>
+        <p14:creationId xmlns:p14="http://schemas.microsoft.com/office/powerpoint/2010/main" val="3287475251"/>
       </p:ext>
     </p:extLst>
   </p:cSld>
@@ -2461,8 +2461,8 @@
         </p:nvSpPr>
         <p:spPr>
           <a:xfrm>
-            <a:off x="445512" y="345011"/>
-            <a:ext cx="5589151" cy="1252534"/>
+            <a:off x="74216" y="57474"/>
+            <a:ext cx="931069" cy="208653"/>
           </a:xfrm>
           <a:prstGeom prst="rect">
             <a:avLst/>
@@ -2494,8 +2494,8 @@
         </p:nvSpPr>
         <p:spPr>
           <a:xfrm>
-            <a:off x="445512" y="1725046"/>
-            <a:ext cx="5589151" cy="4111612"/>
+            <a:off x="74216" y="287367"/>
+            <a:ext cx="931069" cy="684933"/>
           </a:xfrm>
           <a:prstGeom prst="rect">
             <a:avLst/>
@@ -2556,8 +2556,8 @@
         </p:nvSpPr>
         <p:spPr>
           <a:xfrm>
-            <a:off x="445512" y="6006164"/>
-            <a:ext cx="1458039" cy="345009"/>
+            <a:off x="74215" y="1000537"/>
+            <a:ext cx="242888" cy="57473"/>
           </a:xfrm>
           <a:prstGeom prst="rect">
             <a:avLst/>
@@ -2567,7 +2567,7 @@
           <a:bodyPr vert="horz" lIns="91440" tIns="45720" rIns="91440" bIns="45720" rtlCol="0" anchor="ctr"/>
           <a:lstStyle>
             <a:lvl1pPr algn="l">
-              <a:defRPr sz="850">
+              <a:defRPr sz="142">
                 <a:solidFill>
                   <a:schemeClr val="tx1">
                     <a:tint val="82000"/>
@@ -2597,8 +2597,8 @@
         </p:nvSpPr>
         <p:spPr>
           <a:xfrm>
-            <a:off x="2146558" y="6006164"/>
-            <a:ext cx="2187059" cy="345009"/>
+            <a:off x="357585" y="1000537"/>
+            <a:ext cx="364331" cy="57473"/>
           </a:xfrm>
           <a:prstGeom prst="rect">
             <a:avLst/>
@@ -2608,7 +2608,7 @@
           <a:bodyPr vert="horz" lIns="91440" tIns="45720" rIns="91440" bIns="45720" rtlCol="0" anchor="ctr"/>
           <a:lstStyle>
             <a:lvl1pPr algn="ctr">
-              <a:defRPr sz="850">
+              <a:defRPr sz="142">
                 <a:solidFill>
                   <a:schemeClr val="tx1">
                     <a:tint val="82000"/>
@@ -2634,8 +2634,8 @@
         </p:nvSpPr>
         <p:spPr>
           <a:xfrm>
-            <a:off x="4576624" y="6006164"/>
-            <a:ext cx="1458039" cy="345009"/>
+            <a:off x="762397" y="1000537"/>
+            <a:ext cx="242888" cy="57473"/>
           </a:xfrm>
           <a:prstGeom prst="rect">
             <a:avLst/>
@@ -2645,7 +2645,7 @@
           <a:bodyPr vert="horz" lIns="91440" tIns="45720" rIns="91440" bIns="45720" rtlCol="0" anchor="ctr"/>
           <a:lstStyle>
             <a:lvl1pPr algn="r">
-              <a:defRPr sz="850">
+              <a:defRPr sz="142">
                 <a:solidFill>
                   <a:schemeClr val="tx1">
                     <a:tint val="82000"/>
@@ -2666,27 +2666,27 @@
     </p:spTree>
     <p:extLst>
       <p:ext uri="{BB962C8B-B14F-4D97-AF65-F5344CB8AC3E}">
-        <p14:creationId xmlns:p14="http://schemas.microsoft.com/office/powerpoint/2010/main" val="1573740745"/>
+        <p14:creationId xmlns:p14="http://schemas.microsoft.com/office/powerpoint/2010/main" val="2646736956"/>
       </p:ext>
     </p:extLst>
   </p:cSld>
   <p:clrMap bg1="lt1" tx1="dk1" bg2="lt2" tx2="dk2" accent1="accent1" accent2="accent2" accent3="accent3" accent4="accent4" accent5="accent5" accent6="accent6" hlink="hlink" folHlink="folHlink"/>
   <p:sldLayoutIdLst>
-    <p:sldLayoutId id="2147483661" r:id="rId1"/>
-    <p:sldLayoutId id="2147483662" r:id="rId2"/>
-    <p:sldLayoutId id="2147483663" r:id="rId3"/>
-    <p:sldLayoutId id="2147483664" r:id="rId4"/>
-    <p:sldLayoutId id="2147483665" r:id="rId5"/>
-    <p:sldLayoutId id="2147483666" r:id="rId6"/>
-    <p:sldLayoutId id="2147483667" r:id="rId7"/>
-    <p:sldLayoutId id="2147483668" r:id="rId8"/>
-    <p:sldLayoutId id="2147483669" r:id="rId9"/>
-    <p:sldLayoutId id="2147483670" r:id="rId10"/>
-    <p:sldLayoutId id="2147483671" r:id="rId11"/>
+    <p:sldLayoutId id="2147483685" r:id="rId1"/>
+    <p:sldLayoutId id="2147483686" r:id="rId2"/>
+    <p:sldLayoutId id="2147483687" r:id="rId3"/>
+    <p:sldLayoutId id="2147483688" r:id="rId4"/>
+    <p:sldLayoutId id="2147483689" r:id="rId5"/>
+    <p:sldLayoutId id="2147483690" r:id="rId6"/>
+    <p:sldLayoutId id="2147483691" r:id="rId7"/>
+    <p:sldLayoutId id="2147483692" r:id="rId8"/>
+    <p:sldLayoutId id="2147483693" r:id="rId9"/>
+    <p:sldLayoutId id="2147483694" r:id="rId10"/>
+    <p:sldLayoutId id="2147483695" r:id="rId11"/>
   </p:sldLayoutIdLst>
   <p:txStyles>
     <p:titleStyle>
-      <a:lvl1pPr algn="l" defTabSz="648035" rtl="0" eaLnBrk="1" latinLnBrk="0" hangingPunct="1">
+      <a:lvl1pPr algn="l" defTabSz="107991" rtl="0" eaLnBrk="1" latinLnBrk="0" hangingPunct="1">
         <a:lnSpc>
           <a:spcPct val="90000"/>
         </a:lnSpc>
@@ -2694,7 +2694,7 @@
           <a:spcPct val="0"/>
         </a:spcBef>
         <a:buNone/>
-        <a:defRPr sz="3118" kern="1200">
+        <a:defRPr sz="520" kern="1200">
           <a:solidFill>
             <a:schemeClr val="tx1"/>
           </a:solidFill>
@@ -2705,16 +2705,16 @@
       </a:lvl1pPr>
     </p:titleStyle>
     <p:bodyStyle>
-      <a:lvl1pPr marL="162009" indent="-162009" algn="l" defTabSz="648035" rtl="0" eaLnBrk="1" latinLnBrk="0" hangingPunct="1">
+      <a:lvl1pPr marL="26998" indent="-26998" algn="l" defTabSz="107991" rtl="0" eaLnBrk="1" latinLnBrk="0" hangingPunct="1">
         <a:lnSpc>
           <a:spcPct val="90000"/>
         </a:lnSpc>
         <a:spcBef>
-          <a:spcPts val="709"/>
+          <a:spcPts val="118"/>
         </a:spcBef>
         <a:buFont typeface="Arial" panose="020B0604020202020204" pitchFamily="34" charset="0"/>
         <a:buChar char="•"/>
-        <a:defRPr sz="1984" kern="1200">
+        <a:defRPr sz="331" kern="1200">
           <a:solidFill>
             <a:schemeClr val="tx1"/>
           </a:solidFill>
@@ -2723,16 +2723,16 @@
           <a:cs typeface="+mn-cs"/>
         </a:defRPr>
       </a:lvl1pPr>
-      <a:lvl2pPr marL="486026" indent="-162009" algn="l" defTabSz="648035" rtl="0" eaLnBrk="1" latinLnBrk="0" hangingPunct="1">
+      <a:lvl2pPr marL="80993" indent="-26998" algn="l" defTabSz="107991" rtl="0" eaLnBrk="1" latinLnBrk="0" hangingPunct="1">
         <a:lnSpc>
           <a:spcPct val="90000"/>
         </a:lnSpc>
         <a:spcBef>
-          <a:spcPts val="354"/>
+          <a:spcPts val="59"/>
         </a:spcBef>
         <a:buFont typeface="Arial" panose="020B0604020202020204" pitchFamily="34" charset="0"/>
         <a:buChar char="•"/>
-        <a:defRPr sz="1701" kern="1200">
+        <a:defRPr sz="283" kern="1200">
           <a:solidFill>
             <a:schemeClr val="tx1"/>
           </a:solidFill>
@@ -2741,16 +2741,16 @@
           <a:cs typeface="+mn-cs"/>
         </a:defRPr>
       </a:lvl2pPr>
-      <a:lvl3pPr marL="810044" indent="-162009" algn="l" defTabSz="648035" rtl="0" eaLnBrk="1" latinLnBrk="0" hangingPunct="1">
+      <a:lvl3pPr marL="134988" indent="-26998" algn="l" defTabSz="107991" rtl="0" eaLnBrk="1" latinLnBrk="0" hangingPunct="1">
         <a:lnSpc>
           <a:spcPct val="90000"/>
         </a:lnSpc>
         <a:spcBef>
-          <a:spcPts val="354"/>
+          <a:spcPts val="59"/>
         </a:spcBef>
         <a:buFont typeface="Arial" panose="020B0604020202020204" pitchFamily="34" charset="0"/>
         <a:buChar char="•"/>
-        <a:defRPr sz="1417" kern="1200">
+        <a:defRPr sz="236" kern="1200">
           <a:solidFill>
             <a:schemeClr val="tx1"/>
           </a:solidFill>
@@ -2759,16 +2759,16 @@
           <a:cs typeface="+mn-cs"/>
         </a:defRPr>
       </a:lvl3pPr>
-      <a:lvl4pPr marL="1134062" indent="-162009" algn="l" defTabSz="648035" rtl="0" eaLnBrk="1" latinLnBrk="0" hangingPunct="1">
+      <a:lvl4pPr marL="188984" indent="-26998" algn="l" defTabSz="107991" rtl="0" eaLnBrk="1" latinLnBrk="0" hangingPunct="1">
         <a:lnSpc>
           <a:spcPct val="90000"/>
         </a:lnSpc>
         <a:spcBef>
-          <a:spcPts val="354"/>
+          <a:spcPts val="59"/>
         </a:spcBef>
         <a:buFont typeface="Arial" panose="020B0604020202020204" pitchFamily="34" charset="0"/>
         <a:buChar char="•"/>
-        <a:defRPr sz="1276" kern="1200">
+        <a:defRPr sz="213" kern="1200">
           <a:solidFill>
             <a:schemeClr val="tx1"/>
           </a:solidFill>
@@ -2777,16 +2777,16 @@
           <a:cs typeface="+mn-cs"/>
         </a:defRPr>
       </a:lvl4pPr>
-      <a:lvl5pPr marL="1458079" indent="-162009" algn="l" defTabSz="648035" rtl="0" eaLnBrk="1" latinLnBrk="0" hangingPunct="1">
+      <a:lvl5pPr marL="242979" indent="-26998" algn="l" defTabSz="107991" rtl="0" eaLnBrk="1" latinLnBrk="0" hangingPunct="1">
         <a:lnSpc>
           <a:spcPct val="90000"/>
         </a:lnSpc>
         <a:spcBef>
-          <a:spcPts val="354"/>
+          <a:spcPts val="59"/>
         </a:spcBef>
         <a:buFont typeface="Arial" panose="020B0604020202020204" pitchFamily="34" charset="0"/>
         <a:buChar char="•"/>
-        <a:defRPr sz="1276" kern="1200">
+        <a:defRPr sz="213" kern="1200">
           <a:solidFill>
             <a:schemeClr val="tx1"/>
           </a:solidFill>
@@ -2795,16 +2795,16 @@
           <a:cs typeface="+mn-cs"/>
         </a:defRPr>
       </a:lvl5pPr>
-      <a:lvl6pPr marL="1782097" indent="-162009" algn="l" defTabSz="648035" rtl="0" eaLnBrk="1" latinLnBrk="0" hangingPunct="1">
+      <a:lvl6pPr marL="296974" indent="-26998" algn="l" defTabSz="107991" rtl="0" eaLnBrk="1" latinLnBrk="0" hangingPunct="1">
         <a:lnSpc>
           <a:spcPct val="90000"/>
         </a:lnSpc>
         <a:spcBef>
-          <a:spcPts val="354"/>
+          <a:spcPts val="59"/>
         </a:spcBef>
         <a:buFont typeface="Arial" panose="020B0604020202020204" pitchFamily="34" charset="0"/>
         <a:buChar char="•"/>
-        <a:defRPr sz="1276" kern="1200">
+        <a:defRPr sz="213" kern="1200">
           <a:solidFill>
             <a:schemeClr val="tx1"/>
           </a:solidFill>
@@ -2813,16 +2813,16 @@
           <a:cs typeface="+mn-cs"/>
         </a:defRPr>
       </a:lvl6pPr>
-      <a:lvl7pPr marL="2106115" indent="-162009" algn="l" defTabSz="648035" rtl="0" eaLnBrk="1" latinLnBrk="0" hangingPunct="1">
+      <a:lvl7pPr marL="350970" indent="-26998" algn="l" defTabSz="107991" rtl="0" eaLnBrk="1" latinLnBrk="0" hangingPunct="1">
         <a:lnSpc>
           <a:spcPct val="90000"/>
         </a:lnSpc>
         <a:spcBef>
-          <a:spcPts val="354"/>
+          <a:spcPts val="59"/>
         </a:spcBef>
         <a:buFont typeface="Arial" panose="020B0604020202020204" pitchFamily="34" charset="0"/>
         <a:buChar char="•"/>
-        <a:defRPr sz="1276" kern="1200">
+        <a:defRPr sz="213" kern="1200">
           <a:solidFill>
             <a:schemeClr val="tx1"/>
           </a:solidFill>
@@ -2831,16 +2831,16 @@
           <a:cs typeface="+mn-cs"/>
         </a:defRPr>
       </a:lvl7pPr>
-      <a:lvl8pPr marL="2430132" indent="-162009" algn="l" defTabSz="648035" rtl="0" eaLnBrk="1" latinLnBrk="0" hangingPunct="1">
+      <a:lvl8pPr marL="404965" indent="-26998" algn="l" defTabSz="107991" rtl="0" eaLnBrk="1" latinLnBrk="0" hangingPunct="1">
         <a:lnSpc>
           <a:spcPct val="90000"/>
         </a:lnSpc>
         <a:spcBef>
-          <a:spcPts val="354"/>
+          <a:spcPts val="59"/>
         </a:spcBef>
         <a:buFont typeface="Arial" panose="020B0604020202020204" pitchFamily="34" charset="0"/>
         <a:buChar char="•"/>
-        <a:defRPr sz="1276" kern="1200">
+        <a:defRPr sz="213" kern="1200">
           <a:solidFill>
             <a:schemeClr val="tx1"/>
           </a:solidFill>
@@ -2849,16 +2849,16 @@
           <a:cs typeface="+mn-cs"/>
         </a:defRPr>
       </a:lvl8pPr>
-      <a:lvl9pPr marL="2754150" indent="-162009" algn="l" defTabSz="648035" rtl="0" eaLnBrk="1" latinLnBrk="0" hangingPunct="1">
+      <a:lvl9pPr marL="458960" indent="-26998" algn="l" defTabSz="107991" rtl="0" eaLnBrk="1" latinLnBrk="0" hangingPunct="1">
         <a:lnSpc>
           <a:spcPct val="90000"/>
         </a:lnSpc>
         <a:spcBef>
-          <a:spcPts val="354"/>
+          <a:spcPts val="59"/>
         </a:spcBef>
         <a:buFont typeface="Arial" panose="020B0604020202020204" pitchFamily="34" charset="0"/>
         <a:buChar char="•"/>
-        <a:defRPr sz="1276" kern="1200">
+        <a:defRPr sz="213" kern="1200">
           <a:solidFill>
             <a:schemeClr val="tx1"/>
           </a:solidFill>
@@ -2872,8 +2872,8 @@
       <a:defPPr>
         <a:defRPr lang="en-US"/>
       </a:defPPr>
-      <a:lvl1pPr marL="0" algn="l" defTabSz="648035" rtl="0" eaLnBrk="1" latinLnBrk="0" hangingPunct="1">
-        <a:defRPr sz="1276" kern="1200">
+      <a:lvl1pPr marL="0" algn="l" defTabSz="107991" rtl="0" eaLnBrk="1" latinLnBrk="0" hangingPunct="1">
+        <a:defRPr sz="213" kern="1200">
           <a:solidFill>
             <a:schemeClr val="tx1"/>
           </a:solidFill>
@@ -2882,8 +2882,8 @@
           <a:cs typeface="+mn-cs"/>
         </a:defRPr>
       </a:lvl1pPr>
-      <a:lvl2pPr marL="324018" algn="l" defTabSz="648035" rtl="0" eaLnBrk="1" latinLnBrk="0" hangingPunct="1">
-        <a:defRPr sz="1276" kern="1200">
+      <a:lvl2pPr marL="53995" algn="l" defTabSz="107991" rtl="0" eaLnBrk="1" latinLnBrk="0" hangingPunct="1">
+        <a:defRPr sz="213" kern="1200">
           <a:solidFill>
             <a:schemeClr val="tx1"/>
           </a:solidFill>
@@ -2892,8 +2892,8 @@
           <a:cs typeface="+mn-cs"/>
         </a:defRPr>
       </a:lvl2pPr>
-      <a:lvl3pPr marL="648035" algn="l" defTabSz="648035" rtl="0" eaLnBrk="1" latinLnBrk="0" hangingPunct="1">
-        <a:defRPr sz="1276" kern="1200">
+      <a:lvl3pPr marL="107991" algn="l" defTabSz="107991" rtl="0" eaLnBrk="1" latinLnBrk="0" hangingPunct="1">
+        <a:defRPr sz="213" kern="1200">
           <a:solidFill>
             <a:schemeClr val="tx1"/>
           </a:solidFill>
@@ -2902,8 +2902,8 @@
           <a:cs typeface="+mn-cs"/>
         </a:defRPr>
       </a:lvl3pPr>
-      <a:lvl4pPr marL="972053" algn="l" defTabSz="648035" rtl="0" eaLnBrk="1" latinLnBrk="0" hangingPunct="1">
-        <a:defRPr sz="1276" kern="1200">
+      <a:lvl4pPr marL="161986" algn="l" defTabSz="107991" rtl="0" eaLnBrk="1" latinLnBrk="0" hangingPunct="1">
+        <a:defRPr sz="213" kern="1200">
           <a:solidFill>
             <a:schemeClr val="tx1"/>
           </a:solidFill>
@@ -2912,8 +2912,8 @@
           <a:cs typeface="+mn-cs"/>
         </a:defRPr>
       </a:lvl4pPr>
-      <a:lvl5pPr marL="1296071" algn="l" defTabSz="648035" rtl="0" eaLnBrk="1" latinLnBrk="0" hangingPunct="1">
-        <a:defRPr sz="1276" kern="1200">
+      <a:lvl5pPr marL="215981" algn="l" defTabSz="107991" rtl="0" eaLnBrk="1" latinLnBrk="0" hangingPunct="1">
+        <a:defRPr sz="213" kern="1200">
           <a:solidFill>
             <a:schemeClr val="tx1"/>
           </a:solidFill>
@@ -2922,8 +2922,8 @@
           <a:cs typeface="+mn-cs"/>
         </a:defRPr>
       </a:lvl5pPr>
-      <a:lvl6pPr marL="1620088" algn="l" defTabSz="648035" rtl="0" eaLnBrk="1" latinLnBrk="0" hangingPunct="1">
-        <a:defRPr sz="1276" kern="1200">
+      <a:lvl6pPr marL="269977" algn="l" defTabSz="107991" rtl="0" eaLnBrk="1" latinLnBrk="0" hangingPunct="1">
+        <a:defRPr sz="213" kern="1200">
           <a:solidFill>
             <a:schemeClr val="tx1"/>
           </a:solidFill>
@@ -2932,8 +2932,8 @@
           <a:cs typeface="+mn-cs"/>
         </a:defRPr>
       </a:lvl6pPr>
-      <a:lvl7pPr marL="1944106" algn="l" defTabSz="648035" rtl="0" eaLnBrk="1" latinLnBrk="0" hangingPunct="1">
-        <a:defRPr sz="1276" kern="1200">
+      <a:lvl7pPr marL="323972" algn="l" defTabSz="107991" rtl="0" eaLnBrk="1" latinLnBrk="0" hangingPunct="1">
+        <a:defRPr sz="213" kern="1200">
           <a:solidFill>
             <a:schemeClr val="tx1"/>
           </a:solidFill>
@@ -2942,8 +2942,8 @@
           <a:cs typeface="+mn-cs"/>
         </a:defRPr>
       </a:lvl7pPr>
-      <a:lvl8pPr marL="2268123" algn="l" defTabSz="648035" rtl="0" eaLnBrk="1" latinLnBrk="0" hangingPunct="1">
-        <a:defRPr sz="1276" kern="1200">
+      <a:lvl8pPr marL="377967" algn="l" defTabSz="107991" rtl="0" eaLnBrk="1" latinLnBrk="0" hangingPunct="1">
+        <a:defRPr sz="213" kern="1200">
           <a:solidFill>
             <a:schemeClr val="tx1"/>
           </a:solidFill>
@@ -2952,8 +2952,8 @@
           <a:cs typeface="+mn-cs"/>
         </a:defRPr>
       </a:lvl8pPr>
-      <a:lvl9pPr marL="2592141" algn="l" defTabSz="648035" rtl="0" eaLnBrk="1" latinLnBrk="0" hangingPunct="1">
-        <a:defRPr sz="1276" kern="1200">
+      <a:lvl9pPr marL="431963" algn="l" defTabSz="107991" rtl="0" eaLnBrk="1" latinLnBrk="0" hangingPunct="1">
+        <a:defRPr sz="213" kern="1200">
           <a:solidFill>
             <a:schemeClr val="tx1"/>
           </a:solidFill>
@@ -2998,8 +2998,8 @@
         </p:nvGrpSpPr>
         <p:grpSpPr>
           <a:xfrm>
-            <a:off x="0" y="0"/>
-            <a:ext cx="6480175" cy="6480175"/>
+            <a:off x="-1" y="0"/>
+            <a:ext cx="1079500" cy="1079500"/>
             <a:chOff x="9984432" y="152407"/>
             <a:chExt cx="2016224" cy="2016224"/>
           </a:xfrm>
@@ -3048,8 +3048,8 @@
           </p:nvSpPr>
           <p:spPr>
             <a:xfrm>
-              <a:off x="10788753" y="490507"/>
-              <a:ext cx="407582" cy="114913"/>
+              <a:off x="10353026" y="490507"/>
+              <a:ext cx="1279033" cy="402393"/>
             </a:xfrm>
             <a:prstGeom prst="rect">
               <a:avLst/>
@@ -3063,7 +3063,7 @@
             <a:lstStyle/>
             <a:p>
               <a:r>
-                <a:rPr lang="en-US" altLang="zh-CN" dirty="0">
+                <a:rPr lang="en-US" altLang="zh-CN" sz="800" dirty="0">
                   <a:solidFill>
                     <a:schemeClr val="bg1"/>
                   </a:solidFill>
@@ -3071,7 +3071,7 @@
                 </a:rPr>
                 <a:t>Simulation</a:t>
               </a:r>
-              <a:endParaRPr lang="zh-SG" altLang="en-US" dirty="0">
+              <a:endParaRPr lang="zh-SG" altLang="en-US" sz="800" dirty="0">
                 <a:solidFill>
                   <a:schemeClr val="bg1"/>
                 </a:solidFill>
@@ -3095,8 +3095,8 @@
         </p:nvGrpSpPr>
         <p:grpSpPr>
           <a:xfrm>
-            <a:off x="-1" y="0"/>
-            <a:ext cx="6480175" cy="6480175"/>
+            <a:off x="0" y="0"/>
+            <a:ext cx="1079500" cy="1079500"/>
             <a:chOff x="9984432" y="152407"/>
             <a:chExt cx="2016224" cy="2016224"/>
           </a:xfrm>
@@ -3145,8 +3145,8 @@
           </p:nvSpPr>
           <p:spPr>
             <a:xfrm>
-              <a:off x="10776284" y="490507"/>
-              <a:ext cx="432519" cy="114913"/>
+              <a:off x="10320093" y="490507"/>
+              <a:ext cx="1344901" cy="402393"/>
             </a:xfrm>
             <a:prstGeom prst="rect">
               <a:avLst/>
@@ -3160,7 +3160,7 @@
             <a:lstStyle/>
             <a:p>
               <a:r>
-                <a:rPr lang="en-US" altLang="zh-CN" dirty="0">
+                <a:rPr lang="en-US" altLang="zh-CN" sz="800" dirty="0">
                   <a:solidFill>
                     <a:schemeClr val="bg1"/>
                   </a:solidFill>
@@ -3168,7 +3168,7 @@
                 </a:rPr>
                 <a:t>Experiment</a:t>
               </a:r>
-              <a:endParaRPr lang="zh-SG" altLang="en-US" dirty="0">
+              <a:endParaRPr lang="zh-SG" altLang="en-US" sz="800" dirty="0">
                 <a:solidFill>
                   <a:schemeClr val="bg1"/>
                 </a:solidFill>

</xml_diff>